<commit_message>
fix bugs in hotelling model
</commit_message>
<xml_diff>
--- a/Presentations/Presentation_041518.pptx
+++ b/Presentations/Presentation_041518.pptx
@@ -17,7 +17,6 @@
     <p:sldId id="279" r:id="rId11"/>
     <p:sldId id="280" r:id="rId12"/>
     <p:sldId id="281" r:id="rId13"/>
-    <p:sldId id="282" r:id="rId14"/>
   </p:sldIdLst>
   <p:sldSz cx="12192000" cy="6858000"/>
   <p:notesSz cx="6858000" cy="9144000"/>
@@ -149,7 +148,6 @@
           <p14:sldIdLst>
             <p14:sldId id="280"/>
             <p14:sldId id="281"/>
-            <p14:sldId id="282"/>
           </p14:sldIdLst>
         </p14:section>
       </p14:sectionLst>
@@ -308,7 +306,7 @@
           <a:p>
             <a:fld id="{04DD2273-85A1-DF4B-803E-2C47104E157B}" type="datetimeFigureOut">
               <a:rPr lang="en-US" smtClean="0"/>
-              <a:t>5/3/18</a:t>
+              <a:t>5/11/18</a:t>
             </a:fld>
             <a:endParaRPr lang="en-US"/>
           </a:p>
@@ -506,7 +504,7 @@
           <a:p>
             <a:fld id="{04DD2273-85A1-DF4B-803E-2C47104E157B}" type="datetimeFigureOut">
               <a:rPr lang="en-US" smtClean="0"/>
-              <a:t>5/3/18</a:t>
+              <a:t>5/11/18</a:t>
             </a:fld>
             <a:endParaRPr lang="en-US"/>
           </a:p>
@@ -714,7 +712,7 @@
           <a:p>
             <a:fld id="{04DD2273-85A1-DF4B-803E-2C47104E157B}" type="datetimeFigureOut">
               <a:rPr lang="en-US" smtClean="0"/>
-              <a:t>5/3/18</a:t>
+              <a:t>5/11/18</a:t>
             </a:fld>
             <a:endParaRPr lang="en-US"/>
           </a:p>
@@ -912,7 +910,7 @@
           <a:p>
             <a:fld id="{04DD2273-85A1-DF4B-803E-2C47104E157B}" type="datetimeFigureOut">
               <a:rPr lang="en-US" smtClean="0"/>
-              <a:t>5/3/18</a:t>
+              <a:t>5/11/18</a:t>
             </a:fld>
             <a:endParaRPr lang="en-US"/>
           </a:p>
@@ -1187,7 +1185,7 @@
           <a:p>
             <a:fld id="{04DD2273-85A1-DF4B-803E-2C47104E157B}" type="datetimeFigureOut">
               <a:rPr lang="en-US" smtClean="0"/>
-              <a:t>5/3/18</a:t>
+              <a:t>5/11/18</a:t>
             </a:fld>
             <a:endParaRPr lang="en-US"/>
           </a:p>
@@ -1452,7 +1450,7 @@
           <a:p>
             <a:fld id="{04DD2273-85A1-DF4B-803E-2C47104E157B}" type="datetimeFigureOut">
               <a:rPr lang="en-US" smtClean="0"/>
-              <a:t>5/3/18</a:t>
+              <a:t>5/11/18</a:t>
             </a:fld>
             <a:endParaRPr lang="en-US"/>
           </a:p>
@@ -1864,7 +1862,7 @@
           <a:p>
             <a:fld id="{04DD2273-85A1-DF4B-803E-2C47104E157B}" type="datetimeFigureOut">
               <a:rPr lang="en-US" smtClean="0"/>
-              <a:t>5/3/18</a:t>
+              <a:t>5/11/18</a:t>
             </a:fld>
             <a:endParaRPr lang="en-US"/>
           </a:p>
@@ -2005,7 +2003,7 @@
           <a:p>
             <a:fld id="{04DD2273-85A1-DF4B-803E-2C47104E157B}" type="datetimeFigureOut">
               <a:rPr lang="en-US" smtClean="0"/>
-              <a:t>5/3/18</a:t>
+              <a:t>5/11/18</a:t>
             </a:fld>
             <a:endParaRPr lang="en-US"/>
           </a:p>
@@ -2118,7 +2116,7 @@
           <a:p>
             <a:fld id="{04DD2273-85A1-DF4B-803E-2C47104E157B}" type="datetimeFigureOut">
               <a:rPr lang="en-US" smtClean="0"/>
-              <a:t>5/3/18</a:t>
+              <a:t>5/11/18</a:t>
             </a:fld>
             <a:endParaRPr lang="en-US"/>
           </a:p>
@@ -2429,7 +2427,7 @@
           <a:p>
             <a:fld id="{04DD2273-85A1-DF4B-803E-2C47104E157B}" type="datetimeFigureOut">
               <a:rPr lang="en-US" smtClean="0"/>
-              <a:t>5/3/18</a:t>
+              <a:t>5/11/18</a:t>
             </a:fld>
             <a:endParaRPr lang="en-US"/>
           </a:p>
@@ -2717,7 +2715,7 @@
           <a:p>
             <a:fld id="{04DD2273-85A1-DF4B-803E-2C47104E157B}" type="datetimeFigureOut">
               <a:rPr lang="en-US" smtClean="0"/>
-              <a:t>5/3/18</a:t>
+              <a:t>5/11/18</a:t>
             </a:fld>
             <a:endParaRPr lang="en-US"/>
           </a:p>
@@ -2958,7 +2956,7 @@
           <a:p>
             <a:fld id="{04DD2273-85A1-DF4B-803E-2C47104E157B}" type="datetimeFigureOut">
               <a:rPr lang="en-US" smtClean="0"/>
-              <a:t>5/3/18</a:t>
+              <a:t>5/11/18</a:t>
             </a:fld>
             <a:endParaRPr lang="en-US"/>
           </a:p>
@@ -4123,158 +4121,6 @@
 </p:sld>
 </file>
 
-<file path=ppt/slides/slide13.xml><?xml version="1.0" encoding="utf-8"?>
-<p:sld xmlns:a="http://schemas.openxmlformats.org/drawingml/2006/main" xmlns:r="http://schemas.openxmlformats.org/officeDocument/2006/relationships" xmlns:p="http://schemas.openxmlformats.org/presentationml/2006/main">
-  <p:cSld>
-    <p:spTree>
-      <p:nvGrpSpPr>
-        <p:cNvPr id="1" name=""/>
-        <p:cNvGrpSpPr/>
-        <p:nvPr/>
-      </p:nvGrpSpPr>
-      <p:grpSpPr>
-        <a:xfrm>
-          <a:off x="0" y="0"/>
-          <a:ext cx="0" cy="0"/>
-          <a:chOff x="0" y="0"/>
-          <a:chExt cx="0" cy="0"/>
-        </a:xfrm>
-      </p:grpSpPr>
-      <p:sp>
-        <p:nvSpPr>
-          <p:cNvPr id="2" name="Title 1">
-            <a:extLst>
-              <a:ext uri="{FF2B5EF4-FFF2-40B4-BE49-F238E27FC236}">
-                <a16:creationId xmlns:a16="http://schemas.microsoft.com/office/drawing/2014/main" id="{5841EE40-6052-AA47-A022-3728CED8F0A6}"/>
-              </a:ext>
-            </a:extLst>
-          </p:cNvPr>
-          <p:cNvSpPr>
-            <a:spLocks noGrp="1"/>
-          </p:cNvSpPr>
-          <p:nvPr>
-            <p:ph type="title"/>
-          </p:nvPr>
-        </p:nvSpPr>
-        <p:spPr/>
-        <p:txBody>
-          <a:bodyPr/>
-          <a:lstStyle/>
-          <a:p>
-            <a:endParaRPr lang="en-US"/>
-          </a:p>
-        </p:txBody>
-      </p:sp>
-      <p:sp>
-        <p:nvSpPr>
-          <p:cNvPr id="3" name="Content Placeholder 2">
-            <a:extLst>
-              <a:ext uri="{FF2B5EF4-FFF2-40B4-BE49-F238E27FC236}">
-                <a16:creationId xmlns:a16="http://schemas.microsoft.com/office/drawing/2014/main" id="{FF53EA82-01CC-5347-9440-9E4C4BA20AD6}"/>
-              </a:ext>
-            </a:extLst>
-          </p:cNvPr>
-          <p:cNvSpPr>
-            <a:spLocks noGrp="1"/>
-          </p:cNvSpPr>
-          <p:nvPr>
-            <p:ph idx="1"/>
-          </p:nvPr>
-        </p:nvSpPr>
-        <p:spPr/>
-        <p:txBody>
-          <a:bodyPr/>
-          <a:lstStyle/>
-          <a:p>
-            <a:r>
-              <a:rPr lang="en-US" dirty="0" err="1"/>
-              <a:t>Mandar</a:t>
-            </a:r>
-            <a:r>
-              <a:rPr lang="en-US" dirty="0"/>
-              <a:t> excel con </a:t>
-            </a:r>
-            <a:r>
-              <a:rPr lang="en-US" dirty="0" err="1"/>
-              <a:t>instancias</a:t>
-            </a:r>
-            <a:r>
-              <a:rPr lang="en-US" dirty="0"/>
-              <a:t> de </a:t>
-            </a:r>
-            <a:r>
-              <a:rPr lang="en-US" dirty="0" err="1"/>
-              <a:t>problema</a:t>
-            </a:r>
-            <a:r>
-              <a:rPr lang="en-US" dirty="0"/>
-              <a:t> elastic</a:t>
-            </a:r>
-          </a:p>
-          <a:p>
-            <a:r>
-              <a:rPr lang="en-US" dirty="0" err="1"/>
-              <a:t>Diferencias</a:t>
-            </a:r>
-            <a:r>
-              <a:rPr lang="en-US" dirty="0"/>
-              <a:t> </a:t>
-            </a:r>
-            <a:r>
-              <a:rPr lang="en-US" dirty="0" err="1"/>
-              <a:t>en</a:t>
-            </a:r>
-            <a:r>
-              <a:rPr lang="en-US" dirty="0"/>
-              <a:t> terminus </a:t>
-            </a:r>
-            <a:r>
-              <a:rPr lang="en-US" dirty="0" err="1"/>
-              <a:t>porcentuales</a:t>
-            </a:r>
-            <a:r>
-              <a:rPr lang="en-US" dirty="0"/>
-              <a:t>!!</a:t>
-            </a:r>
-          </a:p>
-          <a:p>
-            <a:r>
-              <a:rPr lang="en-US" dirty="0" err="1"/>
-              <a:t>Terminar</a:t>
-            </a:r>
-            <a:r>
-              <a:rPr lang="en-US" dirty="0"/>
-              <a:t> de </a:t>
-            </a:r>
-            <a:r>
-              <a:rPr lang="en-US" dirty="0" err="1"/>
-              <a:t>documentar</a:t>
-            </a:r>
-            <a:r>
-              <a:rPr lang="en-US" dirty="0"/>
-              <a:t> y </a:t>
-            </a:r>
-            <a:r>
-              <a:rPr lang="en-US" dirty="0" err="1"/>
-              <a:t>mandar</a:t>
-            </a:r>
-            <a:endParaRPr lang="en-US" dirty="0"/>
-          </a:p>
-        </p:txBody>
-      </p:sp>
-    </p:spTree>
-    <p:extLst>
-      <p:ext uri="{BB962C8B-B14F-4D97-AF65-F5344CB8AC3E}">
-        <p14:creationId xmlns:p14="http://schemas.microsoft.com/office/powerpoint/2010/main" val="1060400269"/>
-      </p:ext>
-    </p:extLst>
-  </p:cSld>
-  <p:clrMapOvr>
-    <a:masterClrMapping/>
-  </p:clrMapOvr>
-</p:sld>
-</file>
-
 <file path=ppt/slides/slide2.xml><?xml version="1.0" encoding="utf-8"?>
 <p:sld xmlns:a="http://schemas.openxmlformats.org/drawingml/2006/main" xmlns:r="http://schemas.openxmlformats.org/officeDocument/2006/relationships" xmlns:p="http://schemas.openxmlformats.org/presentationml/2006/main">
   <p:cSld>

</xml_diff>